<commit_message>
add github profile link
</commit_message>
<xml_diff>
--- a/0 Learn Python Programming.pptx
+++ b/0 Learn Python Programming.pptx
@@ -4302,7 +4302,7 @@
               <a:buNone/>
             </a:pPr>
             <a:r>
-              <a:rPr lang="en" sz="1400">
+              <a:rPr lang="en-US" sz="1400">
                 <a:latin typeface="Trebuchet MS" panose="020B0603020202020204" pitchFamily="34" charset="0"/>
               </a:rPr>
               <a:t>You can find me at:</a:t>
@@ -4319,13 +4319,35 @@
               <a:buNone/>
             </a:pPr>
             <a:r>
-              <a:rPr lang="en" sz="1100">
+              <a:rPr lang="en-US" sz="1100">
                 <a:latin typeface="Consolas" panose="020B0609020204030204" pitchFamily="49" charset="0"/>
                 <a:hlinkClick r:id="rId5" action="ppaction://hlinkfile"/>
               </a:rPr>
-              <a:t>t.me/alee_rezaa</a:t>
+              <a:t>github.com/AleeRezaa</a:t>
             </a:r>
-            <a:endParaRPr sz="1100">
+            <a:endParaRPr lang="en-US" sz="1100">
+              <a:latin typeface="Consolas" panose="020B0609020204030204" pitchFamily="49" charset="0"/>
+              <a:hlinkClick r:id="" action="ppaction://hlinkfile"/>
+            </a:endParaRPr>
+          </a:p>
+          <a:p>
+            <a:pPr marL="0" lvl="0" indent="0" algn="ctr" rtl="0">
+              <a:spcBef>
+                <a:spcPts val="600"/>
+              </a:spcBef>
+              <a:spcAft>
+                <a:spcPts val="0"/>
+              </a:spcAft>
+              <a:buNone/>
+            </a:pPr>
+            <a:r>
+              <a:rPr lang="en-US" sz="1100">
+                <a:latin typeface="Consolas" panose="020B0609020204030204" pitchFamily="49" charset="0"/>
+                <a:hlinkClick r:id="" action="ppaction://hlinkfile"/>
+              </a:rPr>
+              <a:t>t.me/Alee_Rezaa</a:t>
+            </a:r>
+            <a:endParaRPr lang="en-US" sz="1100">
               <a:latin typeface="Consolas" panose="020B0609020204030204" pitchFamily="49" charset="0"/>
             </a:endParaRPr>
           </a:p>
@@ -4340,13 +4362,13 @@
               <a:buNone/>
             </a:pPr>
             <a:r>
-              <a:rPr lang="en" sz="1100">
+              <a:rPr lang="en-US" sz="1100">
                 <a:latin typeface="Consolas" panose="020B0609020204030204" pitchFamily="49" charset="0"/>
                 <a:hlinkClick r:id="rId6"/>
               </a:rPr>
               <a:t>alee_rezaa@outlook.com</a:t>
             </a:r>
-            <a:endParaRPr sz="1100">
+            <a:endParaRPr lang="en-US" sz="1100">
               <a:latin typeface="Consolas" panose="020B0609020204030204" pitchFamily="49" charset="0"/>
             </a:endParaRPr>
           </a:p>

</xml_diff>